<commit_message>
A bit progress on CNT
</commit_message>
<xml_diff>
--- a/shahil.pptx
+++ b/shahil.pptx
@@ -5,11 +5,14 @@
     <p:sldMasterId id="2147483648" r:id="rId1"/>
   </p:sldMasterIdLst>
   <p:sldIdLst>
-    <p:sldId id="256" r:id="rId2"/>
-    <p:sldId id="257" r:id="rId3"/>
-    <p:sldId id="258" r:id="rId4"/>
-    <p:sldId id="259" r:id="rId5"/>
-    <p:sldId id="260" r:id="rId6"/>
+    <p:sldId id="261" r:id="rId2"/>
+    <p:sldId id="256" r:id="rId3"/>
+    <p:sldId id="257" r:id="rId4"/>
+    <p:sldId id="258" r:id="rId5"/>
+    <p:sldId id="259" r:id="rId6"/>
+    <p:sldId id="260" r:id="rId7"/>
+    <p:sldId id="262" r:id="rId8"/>
+    <p:sldId id="263" r:id="rId9"/>
   </p:sldIdLst>
   <p:sldSz cx="12192000" cy="6858000"/>
   <p:notesSz cx="6858000" cy="9144000"/>
@@ -108,6 +111,11 @@
       </a:defRPr>
     </a:lvl9pPr>
   </p:defaultTextStyle>
+  <p:extLst>
+    <p:ext uri="{EFAFB233-063F-42B5-8137-9DF3F51BA10A}">
+      <p15:sldGuideLst xmlns:p15="http://schemas.microsoft.com/office/powerpoint/2012/main"/>
+    </p:ext>
+  </p:extLst>
 </p:presentation>
 </file>
 
@@ -242,7 +250,7 @@
           <a:p>
             <a:fld id="{AED806E1-40CB-4AD5-A79E-6D47A99B343F}" type="datetimeFigureOut">
               <a:rPr lang="en-IN" smtClean="0"/>
-              <a:t>17-12-2019</a:t>
+              <a:t>19-12-2019</a:t>
             </a:fld>
             <a:endParaRPr lang="en-IN"/>
           </a:p>
@@ -412,7 +420,7 @@
           <a:p>
             <a:fld id="{AED806E1-40CB-4AD5-A79E-6D47A99B343F}" type="datetimeFigureOut">
               <a:rPr lang="en-IN" smtClean="0"/>
-              <a:t>17-12-2019</a:t>
+              <a:t>19-12-2019</a:t>
             </a:fld>
             <a:endParaRPr lang="en-IN"/>
           </a:p>
@@ -592,7 +600,7 @@
           <a:p>
             <a:fld id="{AED806E1-40CB-4AD5-A79E-6D47A99B343F}" type="datetimeFigureOut">
               <a:rPr lang="en-IN" smtClean="0"/>
-              <a:t>17-12-2019</a:t>
+              <a:t>19-12-2019</a:t>
             </a:fld>
             <a:endParaRPr lang="en-IN"/>
           </a:p>
@@ -762,7 +770,7 @@
           <a:p>
             <a:fld id="{AED806E1-40CB-4AD5-A79E-6D47A99B343F}" type="datetimeFigureOut">
               <a:rPr lang="en-IN" smtClean="0"/>
-              <a:t>17-12-2019</a:t>
+              <a:t>19-12-2019</a:t>
             </a:fld>
             <a:endParaRPr lang="en-IN"/>
           </a:p>
@@ -1008,7 +1016,7 @@
           <a:p>
             <a:fld id="{AED806E1-40CB-4AD5-A79E-6D47A99B343F}" type="datetimeFigureOut">
               <a:rPr lang="en-IN" smtClean="0"/>
-              <a:t>17-12-2019</a:t>
+              <a:t>19-12-2019</a:t>
             </a:fld>
             <a:endParaRPr lang="en-IN"/>
           </a:p>
@@ -1240,7 +1248,7 @@
           <a:p>
             <a:fld id="{AED806E1-40CB-4AD5-A79E-6D47A99B343F}" type="datetimeFigureOut">
               <a:rPr lang="en-IN" smtClean="0"/>
-              <a:t>17-12-2019</a:t>
+              <a:t>19-12-2019</a:t>
             </a:fld>
             <a:endParaRPr lang="en-IN"/>
           </a:p>
@@ -1607,7 +1615,7 @@
           <a:p>
             <a:fld id="{AED806E1-40CB-4AD5-A79E-6D47A99B343F}" type="datetimeFigureOut">
               <a:rPr lang="en-IN" smtClean="0"/>
-              <a:t>17-12-2019</a:t>
+              <a:t>19-12-2019</a:t>
             </a:fld>
             <a:endParaRPr lang="en-IN"/>
           </a:p>
@@ -1725,7 +1733,7 @@
           <a:p>
             <a:fld id="{AED806E1-40CB-4AD5-A79E-6D47A99B343F}" type="datetimeFigureOut">
               <a:rPr lang="en-IN" smtClean="0"/>
-              <a:t>17-12-2019</a:t>
+              <a:t>19-12-2019</a:t>
             </a:fld>
             <a:endParaRPr lang="en-IN"/>
           </a:p>
@@ -1820,7 +1828,7 @@
           <a:p>
             <a:fld id="{AED806E1-40CB-4AD5-A79E-6D47A99B343F}" type="datetimeFigureOut">
               <a:rPr lang="en-IN" smtClean="0"/>
-              <a:t>17-12-2019</a:t>
+              <a:t>19-12-2019</a:t>
             </a:fld>
             <a:endParaRPr lang="en-IN"/>
           </a:p>
@@ -2097,7 +2105,7 @@
           <a:p>
             <a:fld id="{AED806E1-40CB-4AD5-A79E-6D47A99B343F}" type="datetimeFigureOut">
               <a:rPr lang="en-IN" smtClean="0"/>
-              <a:t>17-12-2019</a:t>
+              <a:t>19-12-2019</a:t>
             </a:fld>
             <a:endParaRPr lang="en-IN"/>
           </a:p>
@@ -2350,7 +2358,7 @@
           <a:p>
             <a:fld id="{AED806E1-40CB-4AD5-A79E-6D47A99B343F}" type="datetimeFigureOut">
               <a:rPr lang="en-IN" smtClean="0"/>
-              <a:t>17-12-2019</a:t>
+              <a:t>19-12-2019</a:t>
             </a:fld>
             <a:endParaRPr lang="en-IN"/>
           </a:p>
@@ -2563,7 +2571,7 @@
           <a:p>
             <a:fld id="{AED806E1-40CB-4AD5-A79E-6D47A99B343F}" type="datetimeFigureOut">
               <a:rPr lang="en-IN" smtClean="0"/>
-              <a:t>17-12-2019</a:t>
+              <a:t>19-12-2019</a:t>
             </a:fld>
             <a:endParaRPr lang="en-IN"/>
           </a:p>
@@ -2968,98 +2976,21 @@
           <a:chExt cx="0" cy="0"/>
         </a:xfrm>
       </p:grpSpPr>
-      <p:pic>
-        <p:nvPicPr>
-          <p:cNvPr id="4" name="Picture 3"/>
-          <p:cNvPicPr>
-            <a:picLocks noChangeAspect="1"/>
-          </p:cNvPicPr>
+      <p:sp>
+        <p:nvSpPr>
+          <p:cNvPr id="2" name="Rectangle 1"/>
+          <p:cNvSpPr/>
           <p:nvPr/>
-        </p:nvPicPr>
-        <p:blipFill>
-          <a:blip r:embed="rId2">
-            <a:extLst>
-              <a:ext uri="{28A0092B-C50C-407E-A947-70E740481C1C}">
-                <a14:useLocalDpi xmlns:a14="http://schemas.microsoft.com/office/drawing/2010/main" val="0"/>
-              </a:ext>
-            </a:extLst>
-          </a:blip>
-          <a:stretch>
-            <a:fillRect/>
-          </a:stretch>
-        </p:blipFill>
-        <p:spPr>
-          <a:xfrm>
-            <a:off x="2706942" y="1249281"/>
-            <a:ext cx="6896100" cy="4600575"/>
+        </p:nvSpPr>
+        <p:spPr>
+          <a:xfrm>
+            <a:off x="2283069" y="2472788"/>
+            <a:ext cx="6096000" cy="646331"/>
           </a:xfrm>
           <a:prstGeom prst="rect">
             <a:avLst/>
           </a:prstGeom>
         </p:spPr>
-      </p:pic>
-      <p:sp>
-        <p:nvSpPr>
-          <p:cNvPr id="5" name="Rectangle 4"/>
-          <p:cNvSpPr/>
-          <p:nvPr/>
-        </p:nvSpPr>
-        <p:spPr>
-          <a:xfrm>
-            <a:off x="3373622" y="149490"/>
-            <a:ext cx="5562741" cy="923330"/>
-          </a:xfrm>
-          <a:prstGeom prst="rect">
-            <a:avLst/>
-          </a:prstGeom>
-          <a:noFill/>
-        </p:spPr>
-        <p:txBody>
-          <a:bodyPr wrap="none" lIns="91440" tIns="45720" rIns="91440" bIns="45720">
-            <a:spAutoFit/>
-          </a:bodyPr>
-          <a:lstStyle/>
-          <a:p>
-            <a:pPr algn="ctr"/>
-            <a:r>
-              <a:rPr lang="en-US" sz="5400" b="1" cap="none" spc="0" dirty="0">
-                <a:ln w="9525">
-                  <a:solidFill>
-                    <a:schemeClr val="bg1"/>
-                  </a:solidFill>
-                  <a:prstDash val="solid"/>
-                </a:ln>
-                <a:solidFill>
-                  <a:schemeClr val="tx1"/>
-                </a:solidFill>
-                <a:effectLst>
-                  <a:outerShdw blurRad="12700" dist="38100" dir="2700000" algn="tl" rotWithShape="0">
-                    <a:schemeClr val="bg1">
-                      <a:lumMod val="50000"/>
-                    </a:schemeClr>
-                  </a:outerShdw>
-                </a:effectLst>
-              </a:rPr>
-              <a:t>Carbon Nanotubes</a:t>
-            </a:r>
-          </a:p>
-        </p:txBody>
-      </p:sp>
-      <p:sp>
-        <p:nvSpPr>
-          <p:cNvPr id="6" name="Rectangle 5"/>
-          <p:cNvSpPr/>
-          <p:nvPr/>
-        </p:nvSpPr>
-        <p:spPr>
-          <a:xfrm>
-            <a:off x="3373622" y="6026317"/>
-            <a:ext cx="6096000" cy="646331"/>
-          </a:xfrm>
-          <a:prstGeom prst="rect">
-            <a:avLst/>
-          </a:prstGeom>
-        </p:spPr>
         <p:txBody>
           <a:bodyPr>
             <a:spAutoFit/>
@@ -3067,14 +2998,10 @@
           <a:lstStyle/>
           <a:p>
             <a:r>
-              <a:rPr lang="en-US" b="0" i="0" dirty="0">
-                <a:solidFill>
-                  <a:srgbClr val="222222"/>
-                </a:solidFill>
-                <a:effectLst/>
-                <a:latin typeface="arial" panose="020B0604020202020204" pitchFamily="34" charset="0"/>
+              <a:rPr lang="en-IN" dirty="0">
+                <a:hlinkClick r:id="rId2"/>
               </a:rPr>
-              <a:t>Carbon nanotubes are tubes made of carbon with diameters typically measured in nanometers</a:t>
+              <a:t>https://www.cheaptubes.com/carbon-nanotubes-properties-and-applications/</a:t>
             </a:r>
             <a:endParaRPr lang="en-IN" dirty="0"/>
           </a:p>
@@ -3083,7 +3010,7 @@
     </p:spTree>
     <p:extLst>
       <p:ext uri="{BB962C8B-B14F-4D97-AF65-F5344CB8AC3E}">
-        <p14:creationId xmlns:p14="http://schemas.microsoft.com/office/powerpoint/2010/main" val="2216979981"/>
+        <p14:creationId xmlns:p14="http://schemas.microsoft.com/office/powerpoint/2010/main" val="439545550"/>
       </p:ext>
     </p:extLst>
   </p:cSld>
@@ -3110,83 +3037,6 @@
           <a:chExt cx="0" cy="0"/>
         </a:xfrm>
       </p:grpSpPr>
-      <p:sp>
-        <p:nvSpPr>
-          <p:cNvPr id="2" name="Rectangle 1"/>
-          <p:cNvSpPr/>
-          <p:nvPr/>
-        </p:nvSpPr>
-        <p:spPr>
-          <a:xfrm>
-            <a:off x="3161732" y="364094"/>
-            <a:ext cx="4790670" cy="584775"/>
-          </a:xfrm>
-          <a:prstGeom prst="rect">
-            <a:avLst/>
-          </a:prstGeom>
-          <a:noFill/>
-        </p:spPr>
-        <p:txBody>
-          <a:bodyPr wrap="none" lIns="91440" tIns="45720" rIns="91440" bIns="45720">
-            <a:spAutoFit/>
-          </a:bodyPr>
-          <a:lstStyle/>
-          <a:p>
-            <a:r>
-              <a:rPr lang="en-IN" sz="3200" dirty="0">
-                <a:ln w="0"/>
-                <a:solidFill>
-                  <a:schemeClr val="accent1"/>
-                </a:solidFill>
-                <a:effectLst>
-                  <a:outerShdw blurRad="38100" dist="25400" dir="5400000" algn="ctr" rotWithShape="0">
-                    <a:srgbClr val="6E747A">
-                      <a:alpha val="43000"/>
-                    </a:srgbClr>
-                  </a:outerShdw>
-                </a:effectLst>
-              </a:rPr>
-              <a:t>Types of Carbon Nanotubes</a:t>
-            </a:r>
-          </a:p>
-        </p:txBody>
-      </p:sp>
-      <p:sp>
-        <p:nvSpPr>
-          <p:cNvPr id="3" name="TextBox 2"/>
-          <p:cNvSpPr txBox="1"/>
-          <p:nvPr/>
-        </p:nvSpPr>
-        <p:spPr>
-          <a:xfrm>
-            <a:off x="1069041" y="4649467"/>
-            <a:ext cx="3568272" cy="369332"/>
-          </a:xfrm>
-          <a:prstGeom prst="rect">
-            <a:avLst/>
-          </a:prstGeom>
-          <a:noFill/>
-        </p:spPr>
-        <p:txBody>
-          <a:bodyPr wrap="square" rtlCol="0">
-            <a:spAutoFit/>
-          </a:bodyPr>
-          <a:lstStyle/>
-          <a:p>
-            <a:pPr marL="285750" indent="-285750">
-              <a:buFont typeface="Arial" panose="020B0604020202020204" pitchFamily="34" charset="0"/>
-              <a:buChar char="•"/>
-            </a:pPr>
-            <a:r>
-              <a:rPr lang="en-US" dirty="0">
-                <a:hlinkClick r:id="rId2"/>
-              </a:rPr>
-              <a:t>Single Walled Carbon Nanotubes</a:t>
-            </a:r>
-            <a:endParaRPr lang="en-US" dirty="0"/>
-          </a:p>
-        </p:txBody>
-      </p:sp>
       <p:pic>
         <p:nvPicPr>
           <p:cNvPr id="4" name="Picture 3"/>
@@ -3196,7 +3046,7 @@
           <p:nvPr/>
         </p:nvPicPr>
         <p:blipFill>
-          <a:blip r:embed="rId3">
+          <a:blip r:embed="rId2">
             <a:extLst>
               <a:ext uri="{28A0092B-C50C-407E-A947-70E740481C1C}">
                 <a14:useLocalDpi xmlns:a14="http://schemas.microsoft.com/office/drawing/2010/main" val="0"/>
@@ -3209,44 +3059,61 @@
         </p:blipFill>
         <p:spPr>
           <a:xfrm>
-            <a:off x="6418133" y="2175455"/>
-            <a:ext cx="3386556" cy="2197013"/>
+            <a:off x="2706942" y="1249281"/>
+            <a:ext cx="6896100" cy="4600575"/>
           </a:xfrm>
           <a:prstGeom prst="rect">
             <a:avLst/>
           </a:prstGeom>
         </p:spPr>
       </p:pic>
-      <p:pic>
-        <p:nvPicPr>
-          <p:cNvPr id="5" name="Picture 4"/>
-          <p:cNvPicPr>
-            <a:picLocks noChangeAspect="1"/>
-          </p:cNvPicPr>
+      <p:sp>
+        <p:nvSpPr>
+          <p:cNvPr id="5" name="Rectangle 4"/>
+          <p:cNvSpPr/>
           <p:nvPr/>
-        </p:nvPicPr>
-        <p:blipFill>
-          <a:blip r:embed="rId4">
-            <a:extLst>
-              <a:ext uri="{28A0092B-C50C-407E-A947-70E740481C1C}">
-                <a14:useLocalDpi xmlns:a14="http://schemas.microsoft.com/office/drawing/2010/main" val="0"/>
-              </a:ext>
-            </a:extLst>
-          </a:blip>
-          <a:stretch>
-            <a:fillRect/>
-          </a:stretch>
-        </p:blipFill>
-        <p:spPr>
-          <a:xfrm>
-            <a:off x="1397602" y="2175455"/>
-            <a:ext cx="2911150" cy="2197013"/>
+        </p:nvSpPr>
+        <p:spPr>
+          <a:xfrm>
+            <a:off x="3373622" y="149490"/>
+            <a:ext cx="5562741" cy="923330"/>
           </a:xfrm>
           <a:prstGeom prst="rect">
             <a:avLst/>
           </a:prstGeom>
-        </p:spPr>
-      </p:pic>
+          <a:noFill/>
+        </p:spPr>
+        <p:txBody>
+          <a:bodyPr wrap="none" lIns="91440" tIns="45720" rIns="91440" bIns="45720">
+            <a:spAutoFit/>
+          </a:bodyPr>
+          <a:lstStyle/>
+          <a:p>
+            <a:pPr algn="ctr"/>
+            <a:r>
+              <a:rPr lang="en-US" sz="5400" b="1" cap="none" spc="0" dirty="0">
+                <a:ln w="9525">
+                  <a:solidFill>
+                    <a:schemeClr val="bg1"/>
+                  </a:solidFill>
+                  <a:prstDash val="solid"/>
+                </a:ln>
+                <a:solidFill>
+                  <a:schemeClr val="tx1"/>
+                </a:solidFill>
+                <a:effectLst>
+                  <a:outerShdw blurRad="12700" dist="38100" dir="2700000" algn="tl" rotWithShape="0">
+                    <a:schemeClr val="bg1">
+                      <a:lumMod val="50000"/>
+                    </a:schemeClr>
+                  </a:outerShdw>
+                </a:effectLst>
+              </a:rPr>
+              <a:t>Carbon Nanotubes</a:t>
+            </a:r>
+          </a:p>
+        </p:txBody>
+      </p:sp>
       <p:sp>
         <p:nvSpPr>
           <p:cNvPr id="6" name="Rectangle 5"/>
@@ -3255,31 +3122,28 @@
         </p:nvSpPr>
         <p:spPr>
           <a:xfrm>
-            <a:off x="6360366" y="4372468"/>
-            <a:ext cx="3502090" cy="646331"/>
+            <a:off x="3373622" y="6026317"/>
+            <a:ext cx="6096000" cy="646331"/>
           </a:xfrm>
           <a:prstGeom prst="rect">
             <a:avLst/>
           </a:prstGeom>
         </p:spPr>
         <p:txBody>
-          <a:bodyPr wrap="square">
+          <a:bodyPr>
             <a:spAutoFit/>
           </a:bodyPr>
           <a:lstStyle/>
           <a:p>
-            <a:endParaRPr lang="en-US" dirty="0"/>
-          </a:p>
-          <a:p>
-            <a:pPr marL="285750" indent="-285750">
-              <a:buFont typeface="Arial" panose="020B0604020202020204" pitchFamily="34" charset="0"/>
-              <a:buChar char="•"/>
-            </a:pPr>
-            <a:r>
-              <a:rPr lang="en-US" dirty="0">
-                <a:hlinkClick r:id="rId5"/>
+            <a:r>
+              <a:rPr lang="en-US" b="0" i="0" dirty="0">
+                <a:solidFill>
+                  <a:srgbClr val="222222"/>
+                </a:solidFill>
+                <a:effectLst/>
+                <a:latin typeface="arial" panose="020B0604020202020204" pitchFamily="34" charset="0"/>
               </a:rPr>
-              <a:t>Multi Walled Carbon Nanotubes</a:t>
+              <a:t>Carbon nanotubes are tubes made of carbon with diameters typically measured in nanometers</a:t>
             </a:r>
             <a:endParaRPr lang="en-IN" dirty="0"/>
           </a:p>
@@ -3288,7 +3152,7 @@
     </p:spTree>
     <p:extLst>
       <p:ext uri="{BB962C8B-B14F-4D97-AF65-F5344CB8AC3E}">
-        <p14:creationId xmlns:p14="http://schemas.microsoft.com/office/powerpoint/2010/main" val="3829650832"/>
+        <p14:creationId xmlns:p14="http://schemas.microsoft.com/office/powerpoint/2010/main" val="2216979981"/>
       </p:ext>
     </p:extLst>
   </p:cSld>
@@ -3323,8 +3187,8 @@
         </p:nvSpPr>
         <p:spPr>
           <a:xfrm>
-            <a:off x="3162042" y="130830"/>
-            <a:ext cx="5200462" cy="584775"/>
+            <a:off x="3161732" y="364094"/>
+            <a:ext cx="4790670" cy="584775"/>
           </a:xfrm>
           <a:prstGeom prst="rect">
             <a:avLst/>
@@ -3337,59 +3201,35 @@
           </a:bodyPr>
           <a:lstStyle/>
           <a:p>
-            <a:pPr algn="ctr"/>
-            <a:r>
-              <a:rPr lang="en-IN" sz="3200" b="1" i="1" dirty="0"/>
-              <a:t>Carbon Nanotubes Properties</a:t>
-            </a:r>
-            <a:endParaRPr lang="en-IN" sz="3200" dirty="0"/>
-          </a:p>
-        </p:txBody>
-      </p:sp>
-      <p:sp>
-        <p:nvSpPr>
-          <p:cNvPr id="3" name="Rectangle 2"/>
-          <p:cNvSpPr/>
-          <p:nvPr/>
-        </p:nvSpPr>
-        <p:spPr>
-          <a:xfrm>
-            <a:off x="403107" y="986326"/>
-            <a:ext cx="2672526" cy="369332"/>
-          </a:xfrm>
-          <a:prstGeom prst="rect">
-            <a:avLst/>
-          </a:prstGeom>
-        </p:spPr>
-        <p:txBody>
-          <a:bodyPr wrap="none">
-            <a:spAutoFit/>
-          </a:bodyPr>
-          <a:lstStyle/>
-          <a:p>
-            <a:r>
-              <a:rPr lang="en-IN" b="1" i="0" dirty="0">
+            <a:r>
+              <a:rPr lang="en-IN" sz="3200" dirty="0">
+                <a:ln w="0"/>
                 <a:solidFill>
-                  <a:srgbClr val="333333"/>
+                  <a:schemeClr val="accent1"/>
                 </a:solidFill>
-                <a:effectLst/>
-                <a:latin typeface="Source Sans Pro"/>
+                <a:effectLst>
+                  <a:outerShdw blurRad="38100" dist="25400" dir="5400000" algn="ctr" rotWithShape="0">
+                    <a:srgbClr val="6E747A">
+                      <a:alpha val="43000"/>
+                    </a:srgbClr>
+                  </a:outerShdw>
+                </a:effectLst>
               </a:rPr>
-              <a:t>Electrical Conductivity</a:t>
-            </a:r>
-          </a:p>
-        </p:txBody>
-      </p:sp>
-      <p:sp>
-        <p:nvSpPr>
-          <p:cNvPr id="4" name="TextBox 3"/>
+              <a:t>Types of Carbon Nanotubes</a:t>
+            </a:r>
+          </a:p>
+        </p:txBody>
+      </p:sp>
+      <p:sp>
+        <p:nvSpPr>
+          <p:cNvPr id="3" name="TextBox 2"/>
           <p:cNvSpPr txBox="1"/>
           <p:nvPr/>
         </p:nvSpPr>
         <p:spPr>
           <a:xfrm>
-            <a:off x="714987" y="1358377"/>
-            <a:ext cx="10948277" cy="1754326"/>
+            <a:off x="1069041" y="4649467"/>
+            <a:ext cx="3568272" cy="369332"/>
           </a:xfrm>
           <a:prstGeom prst="rect">
             <a:avLst/>
@@ -3402,127 +3242,113 @@
           </a:bodyPr>
           <a:lstStyle/>
           <a:p>
-            <a:r>
-              <a:rPr lang="en-US" dirty="0"/>
-              <a:t>can be highly conducting, and hence can be said to be metallic.  Their conductivity has been shown to be a function of their chirality (degree of twist), as well as their diameter.  CNTs can be either metallic or semi-conducting in their electrical behavior.</a:t>
-            </a:r>
-          </a:p>
-          <a:p>
+            <a:pPr marL="285750" indent="-285750">
+              <a:buFont typeface="Arial" panose="020B0604020202020204" pitchFamily="34" charset="0"/>
+              <a:buChar char="•"/>
+            </a:pPr>
+            <a:r>
+              <a:rPr lang="en-US" dirty="0">
+                <a:hlinkClick r:id="rId2"/>
+              </a:rPr>
+              <a:t>Single Walled Carbon Nanotubes</a:t>
+            </a:r>
             <a:endParaRPr lang="en-US" dirty="0"/>
           </a:p>
-          <a:p>
-            <a:r>
-              <a:rPr lang="en-US" dirty="0"/>
-              <a:t>The resistivity of the SWNT ropes was in the order of 10</a:t>
-            </a:r>
-            <a:r>
-              <a:rPr lang="en-US" baseline="30000" dirty="0"/>
-              <a:t>–4</a:t>
-            </a:r>
-            <a:r>
-              <a:rPr lang="en-US" dirty="0"/>
-              <a:t> ohm-cm at 27°C.  This means that SWNT ropes are the most conductive carbon fibers known.  The current density that was possible to achieve was 10</a:t>
-            </a:r>
-            <a:r>
-              <a:rPr lang="en-US" baseline="30000" dirty="0"/>
-              <a:t>7</a:t>
-            </a:r>
-            <a:r>
-              <a:rPr lang="en-US" dirty="0"/>
-              <a:t> A/cm</a:t>
-            </a:r>
-            <a:r>
-              <a:rPr lang="en-US" baseline="30000" dirty="0"/>
-              <a:t>2</a:t>
-            </a:r>
-            <a:endParaRPr lang="en-IN" dirty="0"/>
-          </a:p>
-        </p:txBody>
-      </p:sp>
-      <p:sp>
-        <p:nvSpPr>
-          <p:cNvPr id="5" name="Rectangle 4"/>
-          <p:cNvSpPr/>
+        </p:txBody>
+      </p:sp>
+      <p:pic>
+        <p:nvPicPr>
+          <p:cNvPr id="4" name="Picture 3"/>
+          <p:cNvPicPr>
+            <a:picLocks noChangeAspect="1"/>
+          </p:cNvPicPr>
           <p:nvPr/>
-        </p:nvSpPr>
-        <p:spPr>
-          <a:xfrm>
-            <a:off x="403107" y="3207012"/>
-            <a:ext cx="2715230" cy="369332"/>
+        </p:nvPicPr>
+        <p:blipFill>
+          <a:blip r:embed="rId3">
+            <a:extLst>
+              <a:ext uri="{28A0092B-C50C-407E-A947-70E740481C1C}">
+                <a14:useLocalDpi xmlns:a14="http://schemas.microsoft.com/office/drawing/2010/main" val="0"/>
+              </a:ext>
+            </a:extLst>
+          </a:blip>
+          <a:stretch>
+            <a:fillRect/>
+          </a:stretch>
+        </p:blipFill>
+        <p:spPr>
+          <a:xfrm>
+            <a:off x="6418133" y="2175455"/>
+            <a:ext cx="3386556" cy="2197013"/>
           </a:xfrm>
           <a:prstGeom prst="rect">
             <a:avLst/>
           </a:prstGeom>
         </p:spPr>
-        <p:txBody>
-          <a:bodyPr wrap="none">
-            <a:spAutoFit/>
-          </a:bodyPr>
-          <a:lstStyle/>
-          <a:p>
-            <a:r>
-              <a:rPr lang="en-IN" b="1" dirty="0">
-                <a:solidFill>
-                  <a:srgbClr val="333333"/>
-                </a:solidFill>
-                <a:effectLst/>
-                <a:latin typeface="Source Sans Pro"/>
-              </a:rPr>
-              <a:t>Strength And Elasticity</a:t>
-            </a:r>
-          </a:p>
-        </p:txBody>
-      </p:sp>
-      <p:sp>
-        <p:nvSpPr>
-          <p:cNvPr id="6" name="TextBox 5"/>
-          <p:cNvSpPr txBox="1"/>
+      </p:pic>
+      <p:pic>
+        <p:nvPicPr>
+          <p:cNvPr id="5" name="Picture 4"/>
+          <p:cNvPicPr>
+            <a:picLocks noChangeAspect="1"/>
+          </p:cNvPicPr>
           <p:nvPr/>
-        </p:nvSpPr>
-        <p:spPr>
-          <a:xfrm>
-            <a:off x="714987" y="3670653"/>
-            <a:ext cx="10948277" cy="1754326"/>
+        </p:nvPicPr>
+        <p:blipFill>
+          <a:blip r:embed="rId4">
+            <a:extLst>
+              <a:ext uri="{28A0092B-C50C-407E-A947-70E740481C1C}">
+                <a14:useLocalDpi xmlns:a14="http://schemas.microsoft.com/office/drawing/2010/main" val="0"/>
+              </a:ext>
+            </a:extLst>
+          </a:blip>
+          <a:stretch>
+            <a:fillRect/>
+          </a:stretch>
+        </p:blipFill>
+        <p:spPr>
+          <a:xfrm>
+            <a:off x="1397602" y="2175455"/>
+            <a:ext cx="2911150" cy="2197013"/>
           </a:xfrm>
           <a:prstGeom prst="rect">
             <a:avLst/>
           </a:prstGeom>
-          <a:noFill/>
-        </p:spPr>
-        <p:txBody>
-          <a:bodyPr wrap="square" rtlCol="0">
+        </p:spPr>
+      </p:pic>
+      <p:sp>
+        <p:nvSpPr>
+          <p:cNvPr id="6" name="Rectangle 5"/>
+          <p:cNvSpPr/>
+          <p:nvPr/>
+        </p:nvSpPr>
+        <p:spPr>
+          <a:xfrm>
+            <a:off x="6360366" y="4372468"/>
+            <a:ext cx="3502090" cy="646331"/>
+          </a:xfrm>
+          <a:prstGeom prst="rect">
+            <a:avLst/>
+          </a:prstGeom>
+        </p:spPr>
+        <p:txBody>
+          <a:bodyPr wrap="square">
             <a:spAutoFit/>
           </a:bodyPr>
           <a:lstStyle/>
           <a:p>
-            <a:r>
-              <a:rPr lang="en-US" dirty="0"/>
-              <a:t>The carbon atoms of a single (graphene) sheet of graphite form a planar honeycomb lattice, in which each atom is connected via a strong chemical bond to three neighboring atoms. Because of these strong bonds, the basal-plane elastic modulus of graphite is one of the largest of any known material.</a:t>
-            </a:r>
-          </a:p>
-          <a:p>
             <a:endParaRPr lang="en-US" dirty="0"/>
           </a:p>
           <a:p>
-            <a:r>
-              <a:rPr lang="en-US" dirty="0"/>
-              <a:t>The current Young’s modulus value of SWNTs is about 1 </a:t>
-            </a:r>
-            <a:r>
-              <a:rPr lang="en-US" dirty="0" err="1"/>
-              <a:t>TeraPascal</a:t>
-            </a:r>
-            <a:r>
-              <a:rPr lang="en-US" dirty="0"/>
-              <a:t>, but this value has been disputed, and a value as high as 1.8 </a:t>
-            </a:r>
-            <a:r>
-              <a:rPr lang="en-US" dirty="0" err="1"/>
-              <a:t>Tpa</a:t>
-            </a:r>
-            <a:r>
-              <a:rPr lang="en-US" dirty="0"/>
-              <a:t> has been reported.  Other values significantly higher than that have also been reported.</a:t>
+            <a:pPr marL="285750" indent="-285750">
+              <a:buFont typeface="Arial" panose="020B0604020202020204" pitchFamily="34" charset="0"/>
+              <a:buChar char="•"/>
+            </a:pPr>
+            <a:r>
+              <a:rPr lang="en-US" dirty="0">
+                <a:hlinkClick r:id="rId5"/>
+              </a:rPr>
+              <a:t>Multi Walled Carbon Nanotubes</a:t>
             </a:r>
             <a:endParaRPr lang="en-IN" dirty="0"/>
           </a:p>
@@ -3531,7 +3357,7 @@
     </p:spTree>
     <p:extLst>
       <p:ext uri="{BB962C8B-B14F-4D97-AF65-F5344CB8AC3E}">
-        <p14:creationId xmlns:p14="http://schemas.microsoft.com/office/powerpoint/2010/main" val="3810561391"/>
+        <p14:creationId xmlns:p14="http://schemas.microsoft.com/office/powerpoint/2010/main" val="3829650832"/>
       </p:ext>
     </p:extLst>
   </p:cSld>
@@ -3566,36 +3392,8 @@
         </p:nvSpPr>
         <p:spPr>
           <a:xfrm>
-            <a:off x="403107" y="986326"/>
-            <a:ext cx="3696846" cy="369332"/>
-          </a:xfrm>
-          <a:prstGeom prst="rect">
-            <a:avLst/>
-          </a:prstGeom>
-        </p:spPr>
-        <p:txBody>
-          <a:bodyPr wrap="none">
-            <a:spAutoFit/>
-          </a:bodyPr>
-          <a:lstStyle/>
-          <a:p>
-            <a:r>
-              <a:rPr lang="en-IN" b="1" dirty="0"/>
-              <a:t>Thermal Conductivity And Expansion</a:t>
-            </a:r>
-          </a:p>
-        </p:txBody>
-      </p:sp>
-      <p:sp>
-        <p:nvSpPr>
-          <p:cNvPr id="3" name="TextBox 2"/>
-          <p:cNvSpPr txBox="1"/>
-          <p:nvPr/>
-        </p:nvSpPr>
-        <p:spPr>
-          <a:xfrm>
-            <a:off x="714987" y="1358377"/>
-            <a:ext cx="10948277" cy="1477328"/>
+            <a:off x="3162042" y="130830"/>
+            <a:ext cx="5200462" cy="584775"/>
           </a:xfrm>
           <a:prstGeom prst="rect">
             <a:avLst/>
@@ -3603,46 +3401,51 @@
           <a:noFill/>
         </p:spPr>
         <p:txBody>
-          <a:bodyPr wrap="square" rtlCol="0">
+          <a:bodyPr wrap="none" lIns="91440" tIns="45720" rIns="91440" bIns="45720">
             <a:spAutoFit/>
           </a:bodyPr>
           <a:lstStyle/>
           <a:p>
-            <a:r>
-              <a:rPr lang="en-US" dirty="0"/>
-              <a:t>University of Pennsylvania indicates that CNTs may be the best heat-conducting material man has ever known. Ultra-small SWNTs have even been shown to exhibit </a:t>
-            </a:r>
-            <a:r>
-              <a:rPr lang="en-US" i="1" dirty="0"/>
-              <a:t>superconductivity</a:t>
-            </a:r>
-            <a:r>
-              <a:rPr lang="en-US" dirty="0"/>
-              <a:t> below 20</a:t>
-            </a:r>
-            <a:r>
-              <a:rPr lang="en-US" baseline="30000" dirty="0"/>
-              <a:t>o</a:t>
-            </a:r>
-            <a:r>
-              <a:rPr lang="en-US" dirty="0"/>
-              <a:t>K.</a:t>
-            </a:r>
-          </a:p>
-          <a:p>
-            <a:r>
-              <a:rPr lang="en-US" dirty="0"/>
-              <a:t>The strong in-plane graphitic C-C bonds make them exceptionally strong and stiff against axial strains. The almost zero in-plane thermal expansion but large inter-plane expansion of SWNTs implies strong in-plane coupling and high flexibility against </a:t>
-            </a:r>
-            <a:r>
-              <a:rPr lang="en-US" dirty="0" err="1"/>
-              <a:t>nonaxial</a:t>
-            </a:r>
-            <a:r>
-              <a:rPr lang="en-US" dirty="0"/>
-              <a:t> strains.</a:t>
-            </a:r>
-            <a:endParaRPr lang="en-IN" dirty="0"/>
+            <a:pPr algn="ctr"/>
+            <a:r>
+              <a:rPr lang="en-IN" sz="3200" b="1" i="1" dirty="0"/>
+              <a:t>Carbon Nanotubes Properties</a:t>
+            </a:r>
+            <a:endParaRPr lang="en-IN" sz="3200" dirty="0"/>
+          </a:p>
+        </p:txBody>
+      </p:sp>
+      <p:sp>
+        <p:nvSpPr>
+          <p:cNvPr id="3" name="Rectangle 2"/>
+          <p:cNvSpPr/>
+          <p:nvPr/>
+        </p:nvSpPr>
+        <p:spPr>
+          <a:xfrm>
+            <a:off x="403107" y="986326"/>
+            <a:ext cx="2672526" cy="369332"/>
+          </a:xfrm>
+          <a:prstGeom prst="rect">
+            <a:avLst/>
+          </a:prstGeom>
+        </p:spPr>
+        <p:txBody>
+          <a:bodyPr wrap="none">
+            <a:spAutoFit/>
+          </a:bodyPr>
+          <a:lstStyle/>
+          <a:p>
+            <a:r>
+              <a:rPr lang="en-IN" b="1" i="0" dirty="0">
+                <a:solidFill>
+                  <a:srgbClr val="333333"/>
+                </a:solidFill>
+                <a:effectLst/>
+                <a:latin typeface="Source Sans Pro"/>
+              </a:rPr>
+              <a:t>Electrical Conductivity</a:t>
+            </a:r>
           </a:p>
         </p:txBody>
       </p:sp>
@@ -3654,8 +3457,8 @@
         </p:nvSpPr>
         <p:spPr>
           <a:xfrm>
-            <a:off x="714986" y="3340359"/>
-            <a:ext cx="10948277" cy="923330"/>
+            <a:off x="714987" y="1358377"/>
+            <a:ext cx="10948277" cy="1754326"/>
           </a:xfrm>
           <a:prstGeom prst="rect">
             <a:avLst/>
@@ -3670,7 +3473,36 @@
           <a:p>
             <a:r>
               <a:rPr lang="en-US" dirty="0"/>
-              <a:t>Field emission results from the tunneling of electrons from a metal tip into vacuum, under application of a strong electric field. The small diameter and high aspect ratio of CNTs is very favorable for field emission. Even for moderate voltages, a strong electric field develops at the free end of supported CNTs because of their sharpness.</a:t>
+              <a:t>can be highly conducting, and hence can be said to be metallic.  Their conductivity has been shown to be a function of their chirality (degree of twist), as well as their diameter.  CNTs can be either metallic or semi-conducting in their electrical behavior.</a:t>
+            </a:r>
+          </a:p>
+          <a:p>
+            <a:endParaRPr lang="en-US" dirty="0"/>
+          </a:p>
+          <a:p>
+            <a:r>
+              <a:rPr lang="en-US" dirty="0"/>
+              <a:t>The resistivity of the SWNT ropes was in the order of 10</a:t>
+            </a:r>
+            <a:r>
+              <a:rPr lang="en-US" baseline="30000" dirty="0"/>
+              <a:t>–4</a:t>
+            </a:r>
+            <a:r>
+              <a:rPr lang="en-US" dirty="0"/>
+              <a:t> ohm-cm at 27°C.  This means that SWNT ropes are the most conductive carbon fibers known.  The current density that was possible to achieve was 10</a:t>
+            </a:r>
+            <a:r>
+              <a:rPr lang="en-US" baseline="30000" dirty="0"/>
+              <a:t>7</a:t>
+            </a:r>
+            <a:r>
+              <a:rPr lang="en-US" dirty="0"/>
+              <a:t> A/cm</a:t>
+            </a:r>
+            <a:r>
+              <a:rPr lang="en-US" baseline="30000" dirty="0"/>
+              <a:t>2</a:t>
             </a:r>
             <a:endParaRPr lang="en-IN" dirty="0"/>
           </a:p>
@@ -3684,8 +3516,8 @@
         </p:nvSpPr>
         <p:spPr>
           <a:xfrm>
-            <a:off x="403107" y="2971027"/>
-            <a:ext cx="2198038" cy="369332"/>
+            <a:off x="403107" y="3207012"/>
+            <a:ext cx="2715230" cy="369332"/>
           </a:xfrm>
           <a:prstGeom prst="rect">
             <a:avLst/>
@@ -3705,85 +3537,21 @@
                 <a:effectLst/>
                 <a:latin typeface="Source Sans Pro"/>
               </a:rPr>
-              <a:t>Electron Emission</a:t>
-            </a:r>
-          </a:p>
-        </p:txBody>
-      </p:sp>
-      <p:pic>
-        <p:nvPicPr>
-          <p:cNvPr id="6" name="Picture 5"/>
-          <p:cNvPicPr>
-            <a:picLocks noChangeAspect="1"/>
-          </p:cNvPicPr>
-          <p:nvPr/>
-        </p:nvPicPr>
-        <p:blipFill>
-          <a:blip r:embed="rId2">
-            <a:extLst>
-              <a:ext uri="{28A0092B-C50C-407E-A947-70E740481C1C}">
-                <a14:useLocalDpi xmlns:a14="http://schemas.microsoft.com/office/drawing/2010/main" val="0"/>
-              </a:ext>
-            </a:extLst>
-          </a:blip>
-          <a:stretch>
-            <a:fillRect/>
-          </a:stretch>
-        </p:blipFill>
-        <p:spPr>
-          <a:xfrm>
-            <a:off x="2601145" y="4394856"/>
-            <a:ext cx="615461" cy="570782"/>
-          </a:xfrm>
-          <a:prstGeom prst="rect">
-            <a:avLst/>
-          </a:prstGeom>
-        </p:spPr>
-      </p:pic>
-      <p:sp>
-        <p:nvSpPr>
-          <p:cNvPr id="7" name="Rectangle 6"/>
-          <p:cNvSpPr/>
-          <p:nvPr/>
-        </p:nvSpPr>
-        <p:spPr>
-          <a:xfrm>
-            <a:off x="403107" y="5344422"/>
-            <a:ext cx="2163797" cy="369332"/>
-          </a:xfrm>
-          <a:prstGeom prst="rect">
-            <a:avLst/>
-          </a:prstGeom>
-        </p:spPr>
-        <p:txBody>
-          <a:bodyPr wrap="none">
-            <a:spAutoFit/>
-          </a:bodyPr>
-          <a:lstStyle/>
-          <a:p>
-            <a:r>
-              <a:rPr lang="en-IN" b="1" dirty="0">
-                <a:solidFill>
-                  <a:srgbClr val="333333"/>
-                </a:solidFill>
-                <a:effectLst/>
-                <a:latin typeface="Source Sans Pro"/>
-              </a:rPr>
-              <a:t>High Aspect Ratio</a:t>
-            </a:r>
-          </a:p>
-        </p:txBody>
-      </p:sp>
-      <p:sp>
-        <p:nvSpPr>
-          <p:cNvPr id="8" name="TextBox 7"/>
+              <a:t>Strength And Elasticity</a:t>
+            </a:r>
+          </a:p>
+        </p:txBody>
+      </p:sp>
+      <p:sp>
+        <p:nvSpPr>
+          <p:cNvPr id="6" name="TextBox 5"/>
           <p:cNvSpPr txBox="1"/>
           <p:nvPr/>
         </p:nvSpPr>
         <p:spPr>
           <a:xfrm>
-            <a:off x="714985" y="5667587"/>
-            <a:ext cx="10948277" cy="923330"/>
+            <a:off x="714987" y="3670653"/>
+            <a:ext cx="10948277" cy="1754326"/>
           </a:xfrm>
           <a:prstGeom prst="rect">
             <a:avLst/>
@@ -3798,7 +3566,32 @@
           <a:p>
             <a:r>
               <a:rPr lang="en-US" dirty="0"/>
-              <a:t>CNTs have proven to be an excellent additive to impart electrical conductivity in plastics. Their high aspect ratio (about 1000:1) imparts electrical conductivity at lower loadings, compared to conventional additive materials such as carbon black, chopped carbon fiber, or stainless steel fiber.</a:t>
+              <a:t>The carbon atoms of a single (graphene) sheet of graphite form a planar honeycomb lattice, in which each atom is connected via a strong chemical bond to three neighboring atoms. Because of these strong bonds, the basal-plane elastic modulus of graphite is one of the largest of any known material.</a:t>
+            </a:r>
+          </a:p>
+          <a:p>
+            <a:endParaRPr lang="en-US" dirty="0"/>
+          </a:p>
+          <a:p>
+            <a:r>
+              <a:rPr lang="en-US" dirty="0"/>
+              <a:t>The current Young’s modulus value of SWNTs is about 1 </a:t>
+            </a:r>
+            <a:r>
+              <a:rPr lang="en-US" dirty="0" err="1"/>
+              <a:t>TeraPascal</a:t>
+            </a:r>
+            <a:r>
+              <a:rPr lang="en-US" dirty="0"/>
+              <a:t>, but this value has been disputed, and a value as high as 1.8 </a:t>
+            </a:r>
+            <a:r>
+              <a:rPr lang="en-US" dirty="0" err="1"/>
+              <a:t>Tpa</a:t>
+            </a:r>
+            <a:r>
+              <a:rPr lang="en-US" dirty="0"/>
+              <a:t> has been reported.  Other values significantly higher than that have also been reported.</a:t>
             </a:r>
             <a:endParaRPr lang="en-IN" dirty="0"/>
           </a:p>
@@ -3807,7 +3600,7 @@
     </p:spTree>
     <p:extLst>
       <p:ext uri="{BB962C8B-B14F-4D97-AF65-F5344CB8AC3E}">
-        <p14:creationId xmlns:p14="http://schemas.microsoft.com/office/powerpoint/2010/main" val="4160170791"/>
+        <p14:creationId xmlns:p14="http://schemas.microsoft.com/office/powerpoint/2010/main" val="3810561391"/>
       </p:ext>
     </p:extLst>
   </p:cSld>
@@ -3834,10 +3627,808 @@
           <a:chExt cx="0" cy="0"/>
         </a:xfrm>
       </p:grpSpPr>
+      <p:sp>
+        <p:nvSpPr>
+          <p:cNvPr id="2" name="Rectangle 1"/>
+          <p:cNvSpPr/>
+          <p:nvPr/>
+        </p:nvSpPr>
+        <p:spPr>
+          <a:xfrm>
+            <a:off x="403107" y="986326"/>
+            <a:ext cx="3696846" cy="369332"/>
+          </a:xfrm>
+          <a:prstGeom prst="rect">
+            <a:avLst/>
+          </a:prstGeom>
+        </p:spPr>
+        <p:txBody>
+          <a:bodyPr wrap="none">
+            <a:spAutoFit/>
+          </a:bodyPr>
+          <a:lstStyle/>
+          <a:p>
+            <a:r>
+              <a:rPr lang="en-IN" b="1" dirty="0"/>
+              <a:t>Thermal Conductivity And Expansion</a:t>
+            </a:r>
+          </a:p>
+        </p:txBody>
+      </p:sp>
+      <p:sp>
+        <p:nvSpPr>
+          <p:cNvPr id="3" name="TextBox 2"/>
+          <p:cNvSpPr txBox="1"/>
+          <p:nvPr/>
+        </p:nvSpPr>
+        <p:spPr>
+          <a:xfrm>
+            <a:off x="714987" y="1358377"/>
+            <a:ext cx="10948277" cy="1477328"/>
+          </a:xfrm>
+          <a:prstGeom prst="rect">
+            <a:avLst/>
+          </a:prstGeom>
+          <a:noFill/>
+        </p:spPr>
+        <p:txBody>
+          <a:bodyPr wrap="square" rtlCol="0">
+            <a:spAutoFit/>
+          </a:bodyPr>
+          <a:lstStyle/>
+          <a:p>
+            <a:r>
+              <a:rPr lang="en-US" dirty="0"/>
+              <a:t>University of Pennsylvania indicates that CNTs may be the best heat-conducting material man has ever known. Ultra-small SWNTs have even been shown to exhibit </a:t>
+            </a:r>
+            <a:r>
+              <a:rPr lang="en-US" i="1" dirty="0"/>
+              <a:t>superconductivity</a:t>
+            </a:r>
+            <a:r>
+              <a:rPr lang="en-US" dirty="0"/>
+              <a:t> below 20</a:t>
+            </a:r>
+            <a:r>
+              <a:rPr lang="en-US" baseline="30000" dirty="0"/>
+              <a:t>o</a:t>
+            </a:r>
+            <a:r>
+              <a:rPr lang="en-US" dirty="0"/>
+              <a:t>K.</a:t>
+            </a:r>
+          </a:p>
+          <a:p>
+            <a:r>
+              <a:rPr lang="en-US" dirty="0"/>
+              <a:t>The strong in-plane graphitic C-C bonds make them exceptionally strong and stiff against axial strains. The almost zero in-plane thermal expansion but large inter-plane expansion of SWNTs implies strong in-plane coupling and high flexibility against </a:t>
+            </a:r>
+            <a:r>
+              <a:rPr lang="en-US" dirty="0" err="1"/>
+              <a:t>nonaxial</a:t>
+            </a:r>
+            <a:r>
+              <a:rPr lang="en-US" dirty="0"/>
+              <a:t> strains.</a:t>
+            </a:r>
+            <a:endParaRPr lang="en-IN" dirty="0"/>
+          </a:p>
+        </p:txBody>
+      </p:sp>
+      <p:sp>
+        <p:nvSpPr>
+          <p:cNvPr id="4" name="TextBox 3"/>
+          <p:cNvSpPr txBox="1"/>
+          <p:nvPr/>
+        </p:nvSpPr>
+        <p:spPr>
+          <a:xfrm>
+            <a:off x="714986" y="3340359"/>
+            <a:ext cx="10948277" cy="923330"/>
+          </a:xfrm>
+          <a:prstGeom prst="rect">
+            <a:avLst/>
+          </a:prstGeom>
+          <a:noFill/>
+        </p:spPr>
+        <p:txBody>
+          <a:bodyPr wrap="square" rtlCol="0">
+            <a:spAutoFit/>
+          </a:bodyPr>
+          <a:lstStyle/>
+          <a:p>
+            <a:r>
+              <a:rPr lang="en-US" dirty="0"/>
+              <a:t>Field emission results from the tunneling of electrons from a metal tip into vacuum, under application of a strong electric field. The small diameter and high aspect ratio of CNTs is very favorable for field emission. Even for moderate voltages, a strong electric field develops at the free end of supported CNTs because of their sharpness.</a:t>
+            </a:r>
+            <a:endParaRPr lang="en-IN" dirty="0"/>
+          </a:p>
+        </p:txBody>
+      </p:sp>
+      <p:sp>
+        <p:nvSpPr>
+          <p:cNvPr id="5" name="Rectangle 4"/>
+          <p:cNvSpPr/>
+          <p:nvPr/>
+        </p:nvSpPr>
+        <p:spPr>
+          <a:xfrm>
+            <a:off x="403107" y="2971027"/>
+            <a:ext cx="2198038" cy="369332"/>
+          </a:xfrm>
+          <a:prstGeom prst="rect">
+            <a:avLst/>
+          </a:prstGeom>
+        </p:spPr>
+        <p:txBody>
+          <a:bodyPr wrap="none">
+            <a:spAutoFit/>
+          </a:bodyPr>
+          <a:lstStyle/>
+          <a:p>
+            <a:r>
+              <a:rPr lang="en-IN" b="1" dirty="0">
+                <a:solidFill>
+                  <a:srgbClr val="333333"/>
+                </a:solidFill>
+                <a:effectLst/>
+                <a:latin typeface="Source Sans Pro"/>
+              </a:rPr>
+              <a:t>Electron Emission</a:t>
+            </a:r>
+          </a:p>
+        </p:txBody>
+      </p:sp>
+      <p:pic>
+        <p:nvPicPr>
+          <p:cNvPr id="6" name="Picture 5"/>
+          <p:cNvPicPr>
+            <a:picLocks noChangeAspect="1"/>
+          </p:cNvPicPr>
+          <p:nvPr/>
+        </p:nvPicPr>
+        <p:blipFill>
+          <a:blip r:embed="rId2">
+            <a:extLst>
+              <a:ext uri="{28A0092B-C50C-407E-A947-70E740481C1C}">
+                <a14:useLocalDpi xmlns:a14="http://schemas.microsoft.com/office/drawing/2010/main" val="0"/>
+              </a:ext>
+            </a:extLst>
+          </a:blip>
+          <a:stretch>
+            <a:fillRect/>
+          </a:stretch>
+        </p:blipFill>
+        <p:spPr>
+          <a:xfrm>
+            <a:off x="2601145" y="4394856"/>
+            <a:ext cx="615461" cy="570782"/>
+          </a:xfrm>
+          <a:prstGeom prst="rect">
+            <a:avLst/>
+          </a:prstGeom>
+        </p:spPr>
+      </p:pic>
+      <p:sp>
+        <p:nvSpPr>
+          <p:cNvPr id="7" name="Rectangle 6"/>
+          <p:cNvSpPr/>
+          <p:nvPr/>
+        </p:nvSpPr>
+        <p:spPr>
+          <a:xfrm>
+            <a:off x="403107" y="5344422"/>
+            <a:ext cx="2163797" cy="369332"/>
+          </a:xfrm>
+          <a:prstGeom prst="rect">
+            <a:avLst/>
+          </a:prstGeom>
+        </p:spPr>
+        <p:txBody>
+          <a:bodyPr wrap="none">
+            <a:spAutoFit/>
+          </a:bodyPr>
+          <a:lstStyle/>
+          <a:p>
+            <a:r>
+              <a:rPr lang="en-IN" b="1" dirty="0">
+                <a:solidFill>
+                  <a:srgbClr val="333333"/>
+                </a:solidFill>
+                <a:effectLst/>
+                <a:latin typeface="Source Sans Pro"/>
+              </a:rPr>
+              <a:t>High Aspect Ratio</a:t>
+            </a:r>
+          </a:p>
+        </p:txBody>
+      </p:sp>
+      <p:sp>
+        <p:nvSpPr>
+          <p:cNvPr id="8" name="TextBox 7"/>
+          <p:cNvSpPr txBox="1"/>
+          <p:nvPr/>
+        </p:nvSpPr>
+        <p:spPr>
+          <a:xfrm>
+            <a:off x="714985" y="5667587"/>
+            <a:ext cx="10948277" cy="923330"/>
+          </a:xfrm>
+          <a:prstGeom prst="rect">
+            <a:avLst/>
+          </a:prstGeom>
+          <a:noFill/>
+        </p:spPr>
+        <p:txBody>
+          <a:bodyPr wrap="square" rtlCol="0">
+            <a:spAutoFit/>
+          </a:bodyPr>
+          <a:lstStyle/>
+          <a:p>
+            <a:r>
+              <a:rPr lang="en-US" dirty="0"/>
+              <a:t>CNTs have proven to be an excellent additive to impart electrical conductivity in plastics. Their high aspect ratio (about 1000:1) imparts electrical conductivity at lower loadings, compared to conventional additive materials such as carbon black, chopped carbon fiber, or stainless steel fiber.</a:t>
+            </a:r>
+            <a:endParaRPr lang="en-IN" dirty="0"/>
+          </a:p>
+        </p:txBody>
+      </p:sp>
+    </p:spTree>
+    <p:extLst>
+      <p:ext uri="{BB962C8B-B14F-4D97-AF65-F5344CB8AC3E}">
+        <p14:creationId xmlns:p14="http://schemas.microsoft.com/office/powerpoint/2010/main" val="4160170791"/>
+      </p:ext>
+    </p:extLst>
+  </p:cSld>
+  <p:clrMapOvr>
+    <a:masterClrMapping/>
+  </p:clrMapOvr>
+</p:sld>
+</file>
+
+<file path=ppt/slides/slide6.xml><?xml version="1.0" encoding="utf-8"?>
+<p:sld xmlns:a="http://schemas.openxmlformats.org/drawingml/2006/main" xmlns:r="http://schemas.openxmlformats.org/officeDocument/2006/relationships" xmlns:p="http://schemas.openxmlformats.org/presentationml/2006/main">
+  <p:cSld>
+    <p:spTree>
+      <p:nvGrpSpPr>
+        <p:cNvPr id="1" name=""/>
+        <p:cNvGrpSpPr/>
+        <p:nvPr/>
+      </p:nvGrpSpPr>
+      <p:grpSpPr>
+        <a:xfrm>
+          <a:off x="0" y="0"/>
+          <a:ext cx="0" cy="0"/>
+          <a:chOff x="0" y="0"/>
+          <a:chExt cx="0" cy="0"/>
+        </a:xfrm>
+      </p:grpSpPr>
+      <p:sp>
+        <p:nvSpPr>
+          <p:cNvPr id="2" name="Rectangle 1"/>
+          <p:cNvSpPr/>
+          <p:nvPr/>
+        </p:nvSpPr>
+        <p:spPr>
+          <a:xfrm>
+            <a:off x="2448649" y="2883849"/>
+            <a:ext cx="7195111" cy="646331"/>
+          </a:xfrm>
+          <a:prstGeom prst="rect">
+            <a:avLst/>
+          </a:prstGeom>
+        </p:spPr>
+        <p:txBody>
+          <a:bodyPr wrap="none">
+            <a:spAutoFit/>
+          </a:bodyPr>
+          <a:lstStyle/>
+          <a:p>
+            <a:r>
+              <a:rPr lang="en-IN" sz="3600" b="1" i="1" dirty="0">
+                <a:solidFill>
+                  <a:srgbClr val="333333"/>
+                </a:solidFill>
+                <a:latin typeface="Source Sans Pro"/>
+              </a:rPr>
+              <a:t>Carbon Nanotubes Applications</a:t>
+            </a:r>
+            <a:endParaRPr lang="en-IN" sz="3600" b="0" i="0" dirty="0">
+              <a:solidFill>
+                <a:srgbClr val="333333"/>
+              </a:solidFill>
+              <a:effectLst/>
+              <a:latin typeface="Source Sans Pro"/>
+            </a:endParaRPr>
+          </a:p>
+        </p:txBody>
+      </p:sp>
     </p:spTree>
     <p:extLst>
       <p:ext uri="{BB962C8B-B14F-4D97-AF65-F5344CB8AC3E}">
         <p14:creationId xmlns:p14="http://schemas.microsoft.com/office/powerpoint/2010/main" val="2066039282"/>
+      </p:ext>
+    </p:extLst>
+  </p:cSld>
+  <p:clrMapOvr>
+    <a:masterClrMapping/>
+  </p:clrMapOvr>
+</p:sld>
+</file>
+
+<file path=ppt/slides/slide7.xml><?xml version="1.0" encoding="utf-8"?>
+<p:sld xmlns:a="http://schemas.openxmlformats.org/drawingml/2006/main" xmlns:r="http://schemas.openxmlformats.org/officeDocument/2006/relationships" xmlns:p="http://schemas.openxmlformats.org/presentationml/2006/main">
+  <p:cSld>
+    <p:spTree>
+      <p:nvGrpSpPr>
+        <p:cNvPr id="1" name=""/>
+        <p:cNvGrpSpPr/>
+        <p:nvPr/>
+      </p:nvGrpSpPr>
+      <p:grpSpPr>
+        <a:xfrm>
+          <a:off x="0" y="0"/>
+          <a:ext cx="0" cy="0"/>
+          <a:chOff x="0" y="0"/>
+          <a:chExt cx="0" cy="0"/>
+        </a:xfrm>
+      </p:grpSpPr>
+      <p:sp>
+        <p:nvSpPr>
+          <p:cNvPr id="2" name="Rectangle 1"/>
+          <p:cNvSpPr/>
+          <p:nvPr/>
+        </p:nvSpPr>
+        <p:spPr>
+          <a:xfrm>
+            <a:off x="383981" y="1819975"/>
+            <a:ext cx="1890261" cy="369332"/>
+          </a:xfrm>
+          <a:prstGeom prst="rect">
+            <a:avLst/>
+          </a:prstGeom>
+        </p:spPr>
+        <p:txBody>
+          <a:bodyPr wrap="none">
+            <a:spAutoFit/>
+          </a:bodyPr>
+          <a:lstStyle/>
+          <a:p>
+            <a:r>
+              <a:rPr lang="en-IN" b="1" dirty="0">
+                <a:solidFill>
+                  <a:srgbClr val="333333"/>
+                </a:solidFill>
+                <a:latin typeface="Source Sans Pro"/>
+              </a:rPr>
+              <a:t>Energy Storage</a:t>
+            </a:r>
+            <a:endParaRPr lang="en-IN" b="1" dirty="0">
+              <a:solidFill>
+                <a:srgbClr val="333333"/>
+              </a:solidFill>
+              <a:effectLst/>
+              <a:latin typeface="Source Sans Pro"/>
+            </a:endParaRPr>
+          </a:p>
+        </p:txBody>
+      </p:sp>
+      <p:sp>
+        <p:nvSpPr>
+          <p:cNvPr id="3" name="Rectangle 2"/>
+          <p:cNvSpPr/>
+          <p:nvPr/>
+        </p:nvSpPr>
+        <p:spPr>
+          <a:xfrm>
+            <a:off x="3310295" y="215306"/>
+            <a:ext cx="5645584" cy="523220"/>
+          </a:xfrm>
+          <a:prstGeom prst="rect">
+            <a:avLst/>
+          </a:prstGeom>
+        </p:spPr>
+        <p:txBody>
+          <a:bodyPr wrap="none">
+            <a:spAutoFit/>
+          </a:bodyPr>
+          <a:lstStyle/>
+          <a:p>
+            <a:r>
+              <a:rPr lang="en-IN" sz="2800" b="1" i="1" dirty="0">
+                <a:solidFill>
+                  <a:srgbClr val="333333"/>
+                </a:solidFill>
+                <a:latin typeface="Source Sans Pro"/>
+              </a:rPr>
+              <a:t>Carbon Nanotubes Applications</a:t>
+            </a:r>
+            <a:endParaRPr lang="en-IN" sz="2800" dirty="0">
+              <a:solidFill>
+                <a:srgbClr val="333333"/>
+              </a:solidFill>
+              <a:latin typeface="Source Sans Pro"/>
+            </a:endParaRPr>
+          </a:p>
+        </p:txBody>
+      </p:sp>
+      <p:sp>
+        <p:nvSpPr>
+          <p:cNvPr id="5" name="Rectangle 4"/>
+          <p:cNvSpPr/>
+          <p:nvPr/>
+        </p:nvSpPr>
+        <p:spPr>
+          <a:xfrm>
+            <a:off x="383981" y="2189307"/>
+            <a:ext cx="2569934" cy="369332"/>
+          </a:xfrm>
+          <a:prstGeom prst="rect">
+            <a:avLst/>
+          </a:prstGeom>
+        </p:spPr>
+        <p:txBody>
+          <a:bodyPr wrap="none">
+            <a:spAutoFit/>
+          </a:bodyPr>
+          <a:lstStyle/>
+          <a:p>
+            <a:r>
+              <a:rPr lang="en-IN" b="1" dirty="0">
+                <a:solidFill>
+                  <a:srgbClr val="333333"/>
+                </a:solidFill>
+                <a:latin typeface="Source Sans Pro"/>
+              </a:rPr>
+              <a:t>Molecular Electronics</a:t>
+            </a:r>
+            <a:endParaRPr lang="en-IN" b="1" dirty="0">
+              <a:solidFill>
+                <a:srgbClr val="333333"/>
+              </a:solidFill>
+              <a:effectLst/>
+              <a:latin typeface="Source Sans Pro"/>
+            </a:endParaRPr>
+          </a:p>
+        </p:txBody>
+      </p:sp>
+      <p:sp>
+        <p:nvSpPr>
+          <p:cNvPr id="7" name="Rectangle 6"/>
+          <p:cNvSpPr/>
+          <p:nvPr/>
+        </p:nvSpPr>
+        <p:spPr>
+          <a:xfrm>
+            <a:off x="383981" y="2558639"/>
+            <a:ext cx="2146742" cy="369332"/>
+          </a:xfrm>
+          <a:prstGeom prst="rect">
+            <a:avLst/>
+          </a:prstGeom>
+        </p:spPr>
+        <p:txBody>
+          <a:bodyPr wrap="none">
+            <a:spAutoFit/>
+          </a:bodyPr>
+          <a:lstStyle/>
+          <a:p>
+            <a:r>
+              <a:rPr lang="en-IN" b="1" dirty="0">
+                <a:solidFill>
+                  <a:srgbClr val="333333"/>
+                </a:solidFill>
+                <a:latin typeface="Source Sans Pro"/>
+              </a:rPr>
+              <a:t>Thermal Materials</a:t>
+            </a:r>
+            <a:endParaRPr lang="en-IN" b="1" dirty="0">
+              <a:solidFill>
+                <a:srgbClr val="333333"/>
+              </a:solidFill>
+              <a:effectLst/>
+              <a:latin typeface="Source Sans Pro"/>
+            </a:endParaRPr>
+          </a:p>
+        </p:txBody>
+      </p:sp>
+      <p:sp>
+        <p:nvSpPr>
+          <p:cNvPr id="9" name="Rectangle 8"/>
+          <p:cNvSpPr/>
+          <p:nvPr/>
+        </p:nvSpPr>
+        <p:spPr>
+          <a:xfrm>
+            <a:off x="383981" y="2927971"/>
+            <a:ext cx="2339102" cy="369332"/>
+          </a:xfrm>
+          <a:prstGeom prst="rect">
+            <a:avLst/>
+          </a:prstGeom>
+        </p:spPr>
+        <p:txBody>
+          <a:bodyPr wrap="none">
+            <a:spAutoFit/>
+          </a:bodyPr>
+          <a:lstStyle/>
+          <a:p>
+            <a:r>
+              <a:rPr lang="en-IN" b="1" dirty="0">
+                <a:solidFill>
+                  <a:srgbClr val="333333"/>
+                </a:solidFill>
+                <a:latin typeface="Source Sans Pro"/>
+              </a:rPr>
+              <a:t>Structural Materials</a:t>
+            </a:r>
+            <a:endParaRPr lang="en-IN" b="1" dirty="0">
+              <a:solidFill>
+                <a:srgbClr val="333333"/>
+              </a:solidFill>
+              <a:effectLst/>
+              <a:latin typeface="Source Sans Pro"/>
+            </a:endParaRPr>
+          </a:p>
+        </p:txBody>
+      </p:sp>
+      <p:sp>
+        <p:nvSpPr>
+          <p:cNvPr id="10" name="Rectangle 9"/>
+          <p:cNvSpPr/>
+          <p:nvPr/>
+        </p:nvSpPr>
+        <p:spPr>
+          <a:xfrm>
+            <a:off x="383981" y="3297303"/>
+            <a:ext cx="2198038" cy="369332"/>
+          </a:xfrm>
+          <a:prstGeom prst="rect">
+            <a:avLst/>
+          </a:prstGeom>
+        </p:spPr>
+        <p:txBody>
+          <a:bodyPr wrap="none">
+            <a:spAutoFit/>
+          </a:bodyPr>
+          <a:lstStyle/>
+          <a:p>
+            <a:r>
+              <a:rPr lang="en-IN" b="1" dirty="0">
+                <a:solidFill>
+                  <a:srgbClr val="333333"/>
+                </a:solidFill>
+                <a:latin typeface="Source Sans Pro"/>
+              </a:rPr>
+              <a:t>Electrical Emitters</a:t>
+            </a:r>
+            <a:endParaRPr lang="en-IN" b="1" dirty="0">
+              <a:solidFill>
+                <a:srgbClr val="333333"/>
+              </a:solidFill>
+              <a:effectLst/>
+              <a:latin typeface="Source Sans Pro"/>
+            </a:endParaRPr>
+          </a:p>
+        </p:txBody>
+      </p:sp>
+      <p:sp>
+        <p:nvSpPr>
+          <p:cNvPr id="11" name="Rectangle 10"/>
+          <p:cNvSpPr/>
+          <p:nvPr/>
+        </p:nvSpPr>
+        <p:spPr>
+          <a:xfrm>
+            <a:off x="383981" y="3666635"/>
+            <a:ext cx="2266390" cy="369332"/>
+          </a:xfrm>
+          <a:prstGeom prst="rect">
+            <a:avLst/>
+          </a:prstGeom>
+        </p:spPr>
+        <p:txBody>
+          <a:bodyPr wrap="none">
+            <a:spAutoFit/>
+          </a:bodyPr>
+          <a:lstStyle/>
+          <a:p>
+            <a:r>
+              <a:rPr lang="en-IN" b="1" dirty="0">
+                <a:solidFill>
+                  <a:srgbClr val="333333"/>
+                </a:solidFill>
+                <a:latin typeface="Source Sans Pro"/>
+              </a:rPr>
+              <a:t>Fabrics And Fibres</a:t>
+            </a:r>
+            <a:endParaRPr lang="en-IN" b="1" dirty="0">
+              <a:solidFill>
+                <a:srgbClr val="333333"/>
+              </a:solidFill>
+              <a:effectLst/>
+              <a:latin typeface="Source Sans Pro"/>
+            </a:endParaRPr>
+          </a:p>
+        </p:txBody>
+      </p:sp>
+      <p:sp>
+        <p:nvSpPr>
+          <p:cNvPr id="12" name="Rectangle 11"/>
+          <p:cNvSpPr/>
+          <p:nvPr/>
+        </p:nvSpPr>
+        <p:spPr>
+          <a:xfrm>
+            <a:off x="383981" y="4405299"/>
+            <a:ext cx="3399072" cy="369332"/>
+          </a:xfrm>
+          <a:prstGeom prst="rect">
+            <a:avLst/>
+          </a:prstGeom>
+        </p:spPr>
+        <p:txBody>
+          <a:bodyPr wrap="none">
+            <a:spAutoFit/>
+          </a:bodyPr>
+          <a:lstStyle/>
+          <a:p>
+            <a:r>
+              <a:rPr lang="en-US" b="1" dirty="0">
+                <a:solidFill>
+                  <a:schemeClr val="accent1">
+                    <a:lumMod val="50000"/>
+                  </a:schemeClr>
+                </a:solidFill>
+                <a:latin typeface="Source Sans Pro"/>
+              </a:rPr>
+              <a:t>CNTs Air And Water Filtration</a:t>
+            </a:r>
+            <a:endParaRPr lang="en-US" b="1" dirty="0">
+              <a:solidFill>
+                <a:schemeClr val="accent1">
+                  <a:lumMod val="50000"/>
+                </a:schemeClr>
+              </a:solidFill>
+              <a:effectLst/>
+              <a:latin typeface="Source Sans Pro"/>
+            </a:endParaRPr>
+          </a:p>
+        </p:txBody>
+      </p:sp>
+      <p:sp>
+        <p:nvSpPr>
+          <p:cNvPr id="13" name="Rectangle 12"/>
+          <p:cNvSpPr/>
+          <p:nvPr/>
+        </p:nvSpPr>
+        <p:spPr>
+          <a:xfrm>
+            <a:off x="4329548" y="5100002"/>
+            <a:ext cx="3607078" cy="923330"/>
+          </a:xfrm>
+          <a:prstGeom prst="rect">
+            <a:avLst/>
+          </a:prstGeom>
+          <a:noFill/>
+        </p:spPr>
+        <p:txBody>
+          <a:bodyPr wrap="none" lIns="91440" tIns="45720" rIns="91440" bIns="45720">
+            <a:spAutoFit/>
+          </a:bodyPr>
+          <a:lstStyle/>
+          <a:p>
+            <a:pPr algn="ctr"/>
+            <a:r>
+              <a:rPr lang="en-US" sz="5400" dirty="0">
+                <a:ln w="0"/>
+                <a:solidFill>
+                  <a:schemeClr val="accent1"/>
+                </a:solidFill>
+                <a:effectLst>
+                  <a:outerShdw blurRad="38100" dist="25400" dir="5400000" algn="ctr" rotWithShape="0">
+                    <a:srgbClr val="6E747A">
+                      <a:alpha val="43000"/>
+                    </a:srgbClr>
+                  </a:outerShdw>
+                </a:effectLst>
+              </a:rPr>
+              <a:t>AND MORE!</a:t>
+            </a:r>
+            <a:endParaRPr lang="en-US" sz="5400" b="0" cap="none" spc="0" dirty="0">
+              <a:ln w="0"/>
+              <a:solidFill>
+                <a:schemeClr val="accent1"/>
+              </a:solidFill>
+              <a:effectLst>
+                <a:outerShdw blurRad="38100" dist="25400" dir="5400000" algn="ctr" rotWithShape="0">
+                  <a:srgbClr val="6E747A">
+                    <a:alpha val="43000"/>
+                  </a:srgbClr>
+                </a:outerShdw>
+              </a:effectLst>
+            </a:endParaRPr>
+          </a:p>
+        </p:txBody>
+      </p:sp>
+    </p:spTree>
+    <p:extLst>
+      <p:ext uri="{BB962C8B-B14F-4D97-AF65-F5344CB8AC3E}">
+        <p14:creationId xmlns:p14="http://schemas.microsoft.com/office/powerpoint/2010/main" val="3522548402"/>
+      </p:ext>
+    </p:extLst>
+  </p:cSld>
+  <p:clrMapOvr>
+    <a:masterClrMapping/>
+  </p:clrMapOvr>
+</p:sld>
+</file>
+
+<file path=ppt/slides/slide8.xml><?xml version="1.0" encoding="utf-8"?>
+<p:sld xmlns:a="http://schemas.openxmlformats.org/drawingml/2006/main" xmlns:r="http://schemas.openxmlformats.org/officeDocument/2006/relationships" xmlns:p="http://schemas.openxmlformats.org/presentationml/2006/main">
+  <p:cSld>
+    <p:spTree>
+      <p:nvGrpSpPr>
+        <p:cNvPr id="1" name=""/>
+        <p:cNvGrpSpPr/>
+        <p:nvPr/>
+      </p:nvGrpSpPr>
+      <p:grpSpPr>
+        <a:xfrm>
+          <a:off x="0" y="0"/>
+          <a:ext cx="0" cy="0"/>
+          <a:chOff x="0" y="0"/>
+          <a:chExt cx="0" cy="0"/>
+        </a:xfrm>
+      </p:grpSpPr>
+      <p:sp>
+        <p:nvSpPr>
+          <p:cNvPr id="4" name="Rectangle 3"/>
+          <p:cNvSpPr/>
+          <p:nvPr/>
+        </p:nvSpPr>
+        <p:spPr>
+          <a:xfrm>
+            <a:off x="3865168" y="2967335"/>
+            <a:ext cx="4461671" cy="923330"/>
+          </a:xfrm>
+          <a:prstGeom prst="rect">
+            <a:avLst/>
+          </a:prstGeom>
+          <a:noFill/>
+        </p:spPr>
+        <p:txBody>
+          <a:bodyPr wrap="none" lIns="91440" tIns="45720" rIns="91440" bIns="45720">
+            <a:spAutoFit/>
+          </a:bodyPr>
+          <a:lstStyle/>
+          <a:p>
+            <a:pPr algn="ctr"/>
+            <a:r>
+              <a:rPr lang="en-US" sz="5400" b="1" cap="none" spc="0" dirty="0">
+                <a:ln w="22225">
+                  <a:solidFill>
+                    <a:schemeClr val="accent2"/>
+                  </a:solidFill>
+                  <a:prstDash val="solid"/>
+                </a:ln>
+                <a:solidFill>
+                  <a:schemeClr val="accent2">
+                    <a:lumMod val="40000"/>
+                    <a:lumOff val="60000"/>
+                  </a:schemeClr>
+                </a:solidFill>
+                <a:effectLst/>
+              </a:rPr>
+              <a:t>Work yet to do</a:t>
+            </a:r>
+          </a:p>
+        </p:txBody>
+      </p:sp>
+    </p:spTree>
+    <p:extLst>
+      <p:ext uri="{BB962C8B-B14F-4D97-AF65-F5344CB8AC3E}">
+        <p14:creationId xmlns:p14="http://schemas.microsoft.com/office/powerpoint/2010/main" val="4200253779"/>
       </p:ext>
     </p:extLst>
   </p:cSld>

</xml_diff>